<commit_message>
new and hopefully last version of documentation correction
</commit_message>
<xml_diff>
--- a/Мобилен модул за тестова система.pptx
+++ b/Мобилен модул за тестова система.pptx
@@ -14,7 +14,8 @@
     <p:sldId id="264" r:id="rId8"/>
     <p:sldId id="261" r:id="rId9"/>
     <p:sldId id="265" r:id="rId10"/>
-    <p:sldId id="262" r:id="rId11"/>
+    <p:sldId id="266" r:id="rId11"/>
+    <p:sldId id="262" r:id="rId12"/>
   </p:sldIdLst>
   <p:sldSz cx="12192000" cy="6858000"/>
   <p:notesSz cx="6858000" cy="9144000"/>
@@ -747,7 +748,7 @@
             <a:fld id="{52E21538-08EB-4EBB-9002-97DF47438572}" type="datetimeFigureOut">
               <a:rPr lang="bg-BG" smtClean="0"/>
               <a:pPr/>
-              <a:t>28.6.2018 г.</a:t>
+              <a:t>1.7.2018 г.</a:t>
             </a:fld>
             <a:endParaRPr lang="bg-BG"/>
           </a:p>
@@ -945,7 +946,7 @@
             <a:fld id="{52E21538-08EB-4EBB-9002-97DF47438572}" type="datetimeFigureOut">
               <a:rPr lang="bg-BG" smtClean="0"/>
               <a:pPr/>
-              <a:t>28.6.2018 г.</a:t>
+              <a:t>1.7.2018 г.</a:t>
             </a:fld>
             <a:endParaRPr lang="bg-BG"/>
           </a:p>
@@ -1132,7 +1133,7 @@
             <a:fld id="{52E21538-08EB-4EBB-9002-97DF47438572}" type="datetimeFigureOut">
               <a:rPr lang="bg-BG" smtClean="0"/>
               <a:pPr/>
-              <a:t>28.6.2018 г.</a:t>
+              <a:t>1.7.2018 г.</a:t>
             </a:fld>
             <a:endParaRPr lang="bg-BG"/>
           </a:p>
@@ -1284,7 +1285,7 @@
             <a:fld id="{52E21538-08EB-4EBB-9002-97DF47438572}" type="datetimeFigureOut">
               <a:rPr lang="bg-BG" smtClean="0"/>
               <a:pPr/>
-              <a:t>28.6.2018 г.</a:t>
+              <a:t>1.7.2018 г.</a:t>
             </a:fld>
             <a:endParaRPr lang="bg-BG"/>
           </a:p>
@@ -1541,7 +1542,7 @@
             <a:fld id="{52E21538-08EB-4EBB-9002-97DF47438572}" type="datetimeFigureOut">
               <a:rPr lang="bg-BG" smtClean="0"/>
               <a:pPr/>
-              <a:t>28.6.2018 г.</a:t>
+              <a:t>1.7.2018 г.</a:t>
             </a:fld>
             <a:endParaRPr lang="bg-BG"/>
           </a:p>
@@ -1952,7 +1953,7 @@
             <a:fld id="{52E21538-08EB-4EBB-9002-97DF47438572}" type="datetimeFigureOut">
               <a:rPr lang="bg-BG" smtClean="0"/>
               <a:pPr/>
-              <a:t>28.6.2018 г.</a:t>
+              <a:t>1.7.2018 г.</a:t>
             </a:fld>
             <a:endParaRPr lang="bg-BG"/>
           </a:p>
@@ -2400,7 +2401,7 @@
             <a:fld id="{52E21538-08EB-4EBB-9002-97DF47438572}" type="datetimeFigureOut">
               <a:rPr lang="bg-BG" smtClean="0"/>
               <a:pPr/>
-              <a:t>28.6.2018 г.</a:t>
+              <a:t>1.7.2018 г.</a:t>
             </a:fld>
             <a:endParaRPr lang="bg-BG"/>
           </a:p>
@@ -2503,7 +2504,7 @@
             <a:fld id="{52E21538-08EB-4EBB-9002-97DF47438572}" type="datetimeFigureOut">
               <a:rPr lang="bg-BG" smtClean="0"/>
               <a:pPr/>
-              <a:t>28.6.2018 г.</a:t>
+              <a:t>1.7.2018 г.</a:t>
             </a:fld>
             <a:endParaRPr lang="bg-BG"/>
           </a:p>
@@ -2626,7 +2627,7 @@
             <a:fld id="{52E21538-08EB-4EBB-9002-97DF47438572}" type="datetimeFigureOut">
               <a:rPr lang="bg-BG" smtClean="0"/>
               <a:pPr/>
-              <a:t>28.6.2018 г.</a:t>
+              <a:t>1.7.2018 г.</a:t>
             </a:fld>
             <a:endParaRPr lang="bg-BG"/>
           </a:p>
@@ -2902,7 +2903,7 @@
             <a:fld id="{52E21538-08EB-4EBB-9002-97DF47438572}" type="datetimeFigureOut">
               <a:rPr lang="bg-BG" smtClean="0"/>
               <a:pPr/>
-              <a:t>28.6.2018 г.</a:t>
+              <a:t>1.7.2018 г.</a:t>
             </a:fld>
             <a:endParaRPr lang="bg-BG"/>
           </a:p>
@@ -3109,7 +3110,7 @@
             <a:fld id="{52E21538-08EB-4EBB-9002-97DF47438572}" type="datetimeFigureOut">
               <a:rPr lang="bg-BG" smtClean="0"/>
               <a:pPr/>
-              <a:t>28.6.2018 г.</a:t>
+              <a:t>1.7.2018 г.</a:t>
             </a:fld>
             <a:endParaRPr lang="bg-BG"/>
           </a:p>
@@ -4220,7 +4221,7 @@
             <a:fld id="{52E21538-08EB-4EBB-9002-97DF47438572}" type="datetimeFigureOut">
               <a:rPr lang="bg-BG" smtClean="0"/>
               <a:pPr/>
-              <a:t>28.6.2018 г.</a:t>
+              <a:t>1.7.2018 г.</a:t>
             </a:fld>
             <a:endParaRPr lang="bg-BG"/>
           </a:p>
@@ -4640,21 +4641,21 @@
         </p:nvSpPr>
         <p:spPr>
           <a:xfrm>
-            <a:off x="871267" y="1121034"/>
-            <a:ext cx="10420709" cy="1092331"/>
+            <a:off x="1000664" y="198408"/>
+            <a:ext cx="8574658" cy="651984"/>
           </a:xfrm>
         </p:spPr>
         <p:txBody>
           <a:bodyPr>
-            <a:normAutofit fontScale="90000"/>
+            <a:normAutofit/>
           </a:bodyPr>
           <a:lstStyle/>
           <a:p>
             <a:r>
-              <a:rPr lang="bg-BG" dirty="0" smtClean="0"/>
+              <a:rPr lang="bg-BG" sz="3600" dirty="0" smtClean="0"/>
               <a:t>Мобилен модул за тестова система</a:t>
             </a:r>
-            <a:endParaRPr lang="bg-BG" dirty="0"/>
+            <a:endParaRPr lang="bg-BG" sz="3600" dirty="0"/>
           </a:p>
         </p:txBody>
       </p:sp>
@@ -4670,8 +4671,8 @@
         </p:nvSpPr>
         <p:spPr>
           <a:xfrm>
-            <a:off x="1470715" y="2667699"/>
-            <a:ext cx="7766936" cy="3162649"/>
+            <a:off x="0" y="966159"/>
+            <a:ext cx="12192000" cy="3933646"/>
           </a:xfrm>
         </p:spPr>
         <p:txBody>
@@ -4687,15 +4688,15 @@
               <a:defRPr/>
             </a:pPr>
             <a:r>
-              <a:rPr lang="bg-BG" dirty="0" smtClean="0">
+              <a:rPr lang="bg-BG" sz="3500" dirty="0" smtClean="0">
                 <a:solidFill>
                   <a:schemeClr val="tx1"/>
                 </a:solidFill>
               </a:rPr>
-              <a:t>Изготвили: </a:t>
-            </a:r>
-            <a:r>
-              <a:rPr lang="bg-BG" dirty="0">
+              <a:t>Дипломант: </a:t>
+            </a:r>
+            <a:r>
+              <a:rPr lang="bg-BG" sz="3500" dirty="0">
                 <a:solidFill>
                   <a:schemeClr val="tx1"/>
                 </a:solidFill>
@@ -4703,14 +4704,14 @@
               <a:t>Александър </a:t>
             </a:r>
             <a:r>
-              <a:rPr lang="bg-BG" dirty="0" smtClean="0">
+              <a:rPr lang="bg-BG" sz="3500" dirty="0" smtClean="0">
                 <a:solidFill>
                   <a:schemeClr val="tx1"/>
                 </a:solidFill>
               </a:rPr>
-              <a:t>Инджов</a:t>
-            </a:r>
-            <a:endParaRPr lang="bg-BG" dirty="0">
+              <a:t>Руменов Инджов</a:t>
+            </a:r>
+            <a:endParaRPr lang="bg-BG" sz="3500" dirty="0">
               <a:solidFill>
                 <a:schemeClr val="tx1"/>
               </a:solidFill>
@@ -4724,30 +4725,22 @@
               <a:defRPr/>
             </a:pPr>
             <a:r>
-              <a:rPr lang="bg-BG" dirty="0" smtClean="0">
+              <a:rPr lang="bg-BG" sz="3500" smtClean="0">
                 <a:solidFill>
                   <a:schemeClr val="tx1"/>
                 </a:solidFill>
               </a:rPr>
-              <a:t>Специалност:</a:t>
-            </a:r>
-            <a:r>
-              <a:rPr lang="bg-BG" dirty="0">
+              <a:t>Специалност:Софтуерни технологии </a:t>
+            </a:r>
+            <a:r>
+              <a:rPr lang="bg-BG" sz="3500" dirty="0" smtClean="0">
                 <a:solidFill>
                   <a:schemeClr val="tx1"/>
                 </a:solidFill>
               </a:rPr>
-              <a:t>МП СТ със специализация Мобилни </a:t>
-            </a:r>
-            <a:r>
-              <a:rPr lang="bg-BG" dirty="0" smtClean="0">
-                <a:solidFill>
-                  <a:schemeClr val="tx1"/>
-                </a:solidFill>
-              </a:rPr>
-              <a:t>Приложения</a:t>
-            </a:r>
-            <a:endParaRPr lang="en-US" dirty="0">
+              <a:t>със специализация мобилни системи и приложения</a:t>
+            </a:r>
+            <a:endParaRPr lang="en-US" sz="3500" dirty="0">
               <a:solidFill>
                 <a:schemeClr val="tx1"/>
               </a:solidFill>
@@ -4761,22 +4754,14 @@
               <a:defRPr/>
             </a:pPr>
             <a:r>
-              <a:rPr lang="bg-BG" dirty="0" err="1" smtClean="0">
+              <a:rPr lang="bg-BG" sz="3500" dirty="0" smtClean="0">
                 <a:solidFill>
                   <a:schemeClr val="tx1"/>
                 </a:solidFill>
               </a:rPr>
-              <a:t>Факултетени</a:t>
-            </a:r>
-            <a:r>
-              <a:rPr lang="bg-BG" dirty="0" smtClean="0">
-                <a:solidFill>
-                  <a:schemeClr val="tx1"/>
-                </a:solidFill>
-              </a:rPr>
-              <a:t> номера:1701737014</a:t>
-            </a:r>
-            <a:endParaRPr lang="bg-BG" dirty="0">
+              <a:t>Факултетен номер:1701737014</a:t>
+            </a:r>
+            <a:endParaRPr lang="bg-BG" sz="3500" dirty="0">
               <a:solidFill>
                 <a:schemeClr val="tx1"/>
               </a:solidFill>
@@ -4790,7 +4775,7 @@
               <a:defRPr/>
             </a:pPr>
             <a:r>
-              <a:rPr lang="bg-BG" dirty="0">
+              <a:rPr lang="bg-BG" sz="3500" dirty="0">
                 <a:solidFill>
                   <a:schemeClr val="tx1"/>
                 </a:solidFill>
@@ -4798,7 +4783,7 @@
               <a:t>Ръководител: </a:t>
             </a:r>
             <a:r>
-              <a:rPr lang="en-US" i="1" dirty="0" err="1">
+              <a:rPr lang="en-US" sz="3500" i="1" dirty="0" err="1">
                 <a:solidFill>
                   <a:schemeClr val="tx1"/>
                 </a:solidFill>
@@ -4806,7 +4791,7 @@
               <a:t>ас</a:t>
             </a:r>
             <a:r>
-              <a:rPr lang="en-US" i="1" dirty="0">
+              <a:rPr lang="en-US" sz="3500" i="1" dirty="0">
                 <a:solidFill>
                   <a:schemeClr val="tx1"/>
                 </a:solidFill>
@@ -4814,7 +4799,7 @@
               <a:t>. </a:t>
             </a:r>
             <a:r>
-              <a:rPr lang="en-US" i="1" dirty="0" err="1">
+              <a:rPr lang="en-US" sz="3500" i="1" dirty="0" err="1">
                 <a:solidFill>
                   <a:schemeClr val="tx1"/>
                 </a:solidFill>
@@ -4822,7 +4807,7 @@
               <a:t>Йордан</a:t>
             </a:r>
             <a:r>
-              <a:rPr lang="en-US" i="1" dirty="0">
+              <a:rPr lang="en-US" sz="3500" i="1" dirty="0">
                 <a:solidFill>
                   <a:schemeClr val="tx1"/>
                 </a:solidFill>
@@ -4830,14 +4815,14 @@
               <a:t> </a:t>
             </a:r>
             <a:r>
-              <a:rPr lang="en-US" i="1" dirty="0" err="1">
+              <a:rPr lang="en-US" sz="3500" i="1" dirty="0" err="1">
                 <a:solidFill>
                   <a:schemeClr val="tx1"/>
                 </a:solidFill>
               </a:rPr>
               <a:t>Тодоров</a:t>
             </a:r>
-            <a:endParaRPr lang="bg-BG" i="1" dirty="0">
+            <a:endParaRPr lang="bg-BG" sz="3500" i="1" dirty="0">
               <a:solidFill>
                 <a:schemeClr val="tx1"/>
               </a:solidFill>
@@ -4851,14 +4836,14 @@
               <a:defRPr/>
             </a:pPr>
             <a:r>
-              <a:rPr lang="bg-BG" i="1" dirty="0">
+              <a:rPr lang="bg-BG" sz="3500" i="1" dirty="0">
                 <a:solidFill>
                   <a:schemeClr val="tx1"/>
                 </a:solidFill>
               </a:rPr>
               <a:t>Катедра: Компютърни системи</a:t>
             </a:r>
-            <a:endParaRPr lang="bg-BG" dirty="0">
+            <a:endParaRPr lang="bg-BG" sz="3500" dirty="0">
               <a:solidFill>
                 <a:schemeClr val="tx1"/>
               </a:solidFill>
@@ -4908,6 +4893,150 @@
       </p:grpSpPr>
       <p:sp>
         <p:nvSpPr>
+          <p:cNvPr id="2" name="Контейнер за съдържание 1"/>
+          <p:cNvSpPr>
+            <a:spLocks noGrp="1"/>
+          </p:cNvSpPr>
+          <p:nvPr>
+            <p:ph idx="1"/>
+          </p:nvPr>
+        </p:nvSpPr>
+        <p:spPr/>
+        <p:txBody>
+          <a:bodyPr/>
+          <a:lstStyle/>
+          <a:p>
+            <a:r>
+              <a:rPr lang="bg-BG" sz="2400" dirty="0" smtClean="0"/>
+              <a:t>Целта на разработката беше постигната</a:t>
+            </a:r>
+          </a:p>
+          <a:p>
+            <a:pPr>
+              <a:lnSpc>
+                <a:spcPct val="150000"/>
+              </a:lnSpc>
+            </a:pPr>
+            <a:r>
+              <a:rPr lang="bg-BG" sz="2800" dirty="0" smtClean="0"/>
+              <a:t>Бъдещо развитие:</a:t>
+            </a:r>
+          </a:p>
+          <a:p>
+            <a:pPr>
+              <a:lnSpc>
+                <a:spcPct val="150000"/>
+              </a:lnSpc>
+              <a:buNone/>
+            </a:pPr>
+            <a:r>
+              <a:rPr lang="bg-BG" sz="2400" dirty="0" smtClean="0"/>
+              <a:t> -Да се довърши оценяването на предаден тест от студент</a:t>
+            </a:r>
+          </a:p>
+          <a:p>
+            <a:pPr>
+              <a:lnSpc>
+                <a:spcPct val="150000"/>
+              </a:lnSpc>
+              <a:buNone/>
+            </a:pPr>
+            <a:r>
+              <a:rPr lang="bg-BG" sz="2400" dirty="0" smtClean="0"/>
+              <a:t> -Да се довърши преглеждането на статус от </a:t>
+            </a:r>
+            <a:r>
+              <a:rPr lang="bg-BG" sz="2400" dirty="0" smtClean="0"/>
+              <a:t>студента</a:t>
+            </a:r>
+            <a:r>
+              <a:rPr lang="en-US" sz="2400" dirty="0" smtClean="0"/>
+              <a:t> </a:t>
+            </a:r>
+            <a:r>
+              <a:rPr lang="bg-BG" sz="2400" dirty="0" smtClean="0"/>
+              <a:t>и преглеждането </a:t>
+            </a:r>
+            <a:r>
+              <a:rPr lang="bg-BG" sz="2400" dirty="0" smtClean="0"/>
+              <a:t>на направените до сега тестове от студента </a:t>
+            </a:r>
+          </a:p>
+          <a:p>
+            <a:pPr>
+              <a:lnSpc>
+                <a:spcPct val="150000"/>
+              </a:lnSpc>
+              <a:buFontTx/>
+              <a:buChar char="-"/>
+            </a:pPr>
+            <a:r>
+              <a:rPr lang="bg-BG" sz="2400" dirty="0" smtClean="0"/>
+              <a:t>Да се направи таймер за теста</a:t>
+            </a:r>
+            <a:endParaRPr lang="bg-BG" dirty="0"/>
+          </a:p>
+        </p:txBody>
+      </p:sp>
+      <p:sp>
+        <p:nvSpPr>
+          <p:cNvPr id="3" name="Заглавие 2"/>
+          <p:cNvSpPr>
+            <a:spLocks noGrp="1"/>
+          </p:cNvSpPr>
+          <p:nvPr>
+            <p:ph type="title"/>
+          </p:nvPr>
+        </p:nvSpPr>
+        <p:spPr/>
+        <p:txBody>
+          <a:bodyPr>
+            <a:normAutofit/>
+          </a:bodyPr>
+          <a:lstStyle/>
+          <a:p>
+            <a:r>
+              <a:rPr lang="bg-BG" sz="3600" dirty="0" smtClean="0"/>
+              <a:t>Заключение</a:t>
+            </a:r>
+            <a:endParaRPr lang="bg-BG" sz="3600" dirty="0"/>
+          </a:p>
+        </p:txBody>
+      </p:sp>
+    </p:spTree>
+  </p:cSld>
+  <p:clrMapOvr>
+    <a:masterClrMapping/>
+  </p:clrMapOvr>
+  <p:timing>
+    <p:tnLst>
+      <p:par>
+        <p:cTn id="1" dur="indefinite" restart="never" nodeType="tmRoot"/>
+      </p:par>
+    </p:tnLst>
+  </p:timing>
+</p:sld>
+</file>
+
+<file path=ppt/slides/slide11.xml><?xml version="1.0" encoding="utf-8"?>
+<p:sld xmlns:a="http://schemas.openxmlformats.org/drawingml/2006/main" xmlns:r="http://schemas.openxmlformats.org/officeDocument/2006/relationships" xmlns:p="http://schemas.openxmlformats.org/presentationml/2006/main">
+  <p:cSld>
+    <p:spTree>
+      <p:nvGrpSpPr>
+        <p:cNvPr id="1" name=""/>
+        <p:cNvGrpSpPr/>
+        <p:nvPr/>
+      </p:nvGrpSpPr>
+      <p:grpSpPr>
+        <a:xfrm>
+          <a:off x="0" y="0"/>
+          <a:ext cx="0" cy="0"/>
+          <a:chOff x="0" y="0"/>
+          <a:chExt cx="0" cy="0"/>
+        </a:xfrm>
+      </p:grpSpPr>
+      <p:sp>
+        <p:nvSpPr>
           <p:cNvPr id="3" name="Content Placeholder 2"/>
           <p:cNvSpPr>
             <a:spLocks noGrp="1"/>
@@ -4988,8 +5117,8 @@
         </p:nvSpPr>
         <p:spPr>
           <a:xfrm>
-            <a:off x="685961" y="1832785"/>
-            <a:ext cx="8596668" cy="4047264"/>
+            <a:off x="685960" y="1832785"/>
+            <a:ext cx="10226455" cy="3032513"/>
           </a:xfrm>
         </p:spPr>
         <p:txBody>
@@ -5035,7 +5164,19 @@
               <a:rPr lang="bg-BG" altLang="bg-BG" sz="2800" dirty="0">
                 <a:latin typeface="Lucida Sans Unicode (Body)"/>
               </a:rPr>
-              <a:t>технологиите навлизат много бързо в тази </a:t>
+              <a:t>Т</a:t>
+            </a:r>
+            <a:r>
+              <a:rPr lang="bg-BG" altLang="bg-BG" sz="2800" dirty="0" smtClean="0">
+                <a:latin typeface="Lucida Sans Unicode (Body)"/>
+              </a:rPr>
+              <a:t>ехнологиите </a:t>
+            </a:r>
+            <a:r>
+              <a:rPr lang="bg-BG" altLang="bg-BG" sz="2800" dirty="0">
+                <a:latin typeface="Lucida Sans Unicode (Body)"/>
+              </a:rPr>
+              <a:t>навлизат много бързо в тази </a:t>
             </a:r>
             <a:r>
               <a:rPr lang="bg-BG" altLang="bg-BG" sz="2800" dirty="0" smtClean="0">
@@ -5101,14 +5242,10 @@
           <a:lstStyle/>
           <a:p>
             <a:r>
-              <a:rPr lang="bg-BG" dirty="0" smtClean="0"/>
-              <a:t>Увод</a:t>
-            </a:r>
-            <a:r>
-              <a:rPr lang="bg-BG" sz="4000" dirty="0" smtClean="0"/>
-              <a:t> </a:t>
-            </a:r>
-            <a:endParaRPr lang="bg-BG" sz="4000" dirty="0"/>
+              <a:rPr lang="bg-BG" sz="3600" dirty="0" smtClean="0"/>
+              <a:t>Увод </a:t>
+            </a:r>
+            <a:endParaRPr lang="bg-BG" sz="3600" dirty="0"/>
           </a:p>
         </p:txBody>
       </p:sp>
@@ -5227,11 +5364,13 @@
         </p:nvSpPr>
         <p:spPr/>
         <p:txBody>
-          <a:bodyPr/>
+          <a:bodyPr>
+            <a:normAutofit/>
+          </a:bodyPr>
           <a:lstStyle/>
           <a:p>
             <a:r>
-              <a:rPr lang="bg-BG" dirty="0"/>
+              <a:rPr lang="bg-BG" sz="3600" dirty="0"/>
               <a:t>Използвани технологии</a:t>
             </a:r>
           </a:p>
@@ -5459,19 +5598,19 @@
           <a:lstStyle/>
           <a:p>
             <a:r>
-              <a:rPr lang="en-US" dirty="0"/>
+              <a:rPr lang="en-US" sz="3600" dirty="0"/>
               <a:t>Use-case </a:t>
             </a:r>
             <a:r>
-              <a:rPr lang="bg-BG" dirty="0"/>
+              <a:rPr lang="bg-BG" sz="3600" dirty="0"/>
               <a:t>диаграма</a:t>
             </a:r>
             <a:r>
-              <a:rPr lang="en-US" dirty="0"/>
+              <a:rPr lang="en-US" sz="3600" dirty="0"/>
               <a:t> </a:t>
             </a:r>
             <a:r>
-              <a:rPr lang="bg-BG" dirty="0"/>
+              <a:rPr lang="bg-BG" sz="3600" dirty="0"/>
               <a:t>за студент</a:t>
             </a:r>
           </a:p>
@@ -5496,8 +5635,8 @@
         </p:blipFill>
         <p:spPr bwMode="auto">
           <a:xfrm>
-            <a:off x="3126913" y="974785"/>
-            <a:ext cx="5938173" cy="5244860"/>
+            <a:off x="3126913" y="707366"/>
+            <a:ext cx="6836596" cy="5520906"/>
           </a:xfrm>
           <a:prstGeom prst="rect">
             <a:avLst/>
@@ -5560,8 +5699,8 @@
         </p:nvSpPr>
         <p:spPr>
           <a:xfrm>
-            <a:off x="589275" y="290819"/>
-            <a:ext cx="10055721" cy="631971"/>
+            <a:off x="589275" y="0"/>
+            <a:ext cx="11602725" cy="631971"/>
           </a:xfrm>
         </p:spPr>
         <p:txBody>
@@ -5571,26 +5710,26 @@
           <a:lstStyle/>
           <a:p>
             <a:r>
-              <a:rPr lang="en-US" dirty="0"/>
+              <a:rPr lang="en-US" sz="3600" dirty="0"/>
               <a:t>Use-case </a:t>
             </a:r>
             <a:r>
-              <a:rPr lang="bg-BG" dirty="0"/>
+              <a:rPr lang="bg-BG" sz="3600" dirty="0"/>
               <a:t>диаграма</a:t>
             </a:r>
             <a:r>
-              <a:rPr lang="en-US" dirty="0"/>
+              <a:rPr lang="en-US" sz="3600" dirty="0"/>
               <a:t> </a:t>
             </a:r>
             <a:r>
-              <a:rPr lang="bg-BG" dirty="0"/>
+              <a:rPr lang="bg-BG" sz="3600" dirty="0"/>
               <a:t>за </a:t>
             </a:r>
             <a:r>
-              <a:rPr lang="bg-BG" dirty="0" smtClean="0"/>
+              <a:rPr lang="bg-BG" sz="3600" dirty="0" smtClean="0"/>
               <a:t>преподавател</a:t>
             </a:r>
-            <a:endParaRPr lang="bg-BG" dirty="0"/>
+            <a:endParaRPr lang="bg-BG" sz="3600" dirty="0"/>
           </a:p>
         </p:txBody>
       </p:sp>
@@ -5613,8 +5752,8 @@
         </p:blipFill>
         <p:spPr bwMode="auto">
           <a:xfrm>
-            <a:off x="2786111" y="1095555"/>
-            <a:ext cx="6619778" cy="5149970"/>
+            <a:off x="2786111" y="638355"/>
+            <a:ext cx="7375806" cy="5607170"/>
           </a:xfrm>
           <a:prstGeom prst="rect">
             <a:avLst/>
@@ -5688,22 +5827,14 @@
           <a:lstStyle/>
           <a:p>
             <a:r>
-              <a:rPr lang="en-US" dirty="0" smtClean="0"/>
+              <a:rPr lang="en-US" sz="3600" dirty="0" smtClean="0"/>
               <a:t>Activity </a:t>
             </a:r>
             <a:r>
-              <a:rPr lang="bg-BG" dirty="0" smtClean="0"/>
-              <a:t>диаграма за </a:t>
-            </a:r>
-            <a:r>
-              <a:rPr lang="bg-BG" dirty="0" err="1" smtClean="0"/>
-              <a:t>студнта</a:t>
-            </a:r>
-            <a:r>
-              <a:rPr lang="bg-BG" dirty="0" smtClean="0"/>
-              <a:t> </a:t>
-            </a:r>
-            <a:endParaRPr lang="bg-BG" dirty="0"/>
+              <a:rPr lang="bg-BG" sz="3600" dirty="0" smtClean="0"/>
+              <a:t>диаграма за студента </a:t>
+            </a:r>
+            <a:endParaRPr lang="bg-BG" sz="3600" dirty="0"/>
           </a:p>
         </p:txBody>
       </p:sp>
@@ -5795,18 +5926,20 @@
           </a:xfrm>
         </p:spPr>
         <p:txBody>
-          <a:bodyPr/>
+          <a:bodyPr>
+            <a:normAutofit/>
+          </a:bodyPr>
           <a:lstStyle/>
           <a:p>
             <a:r>
-              <a:rPr lang="en-US" dirty="0" smtClean="0"/>
+              <a:rPr lang="en-US" sz="3600" dirty="0" smtClean="0"/>
               <a:t>Activity </a:t>
             </a:r>
             <a:r>
-              <a:rPr lang="bg-BG" dirty="0" smtClean="0"/>
+              <a:rPr lang="bg-BG" sz="3600" dirty="0" smtClean="0"/>
               <a:t>диаграма за преподавател</a:t>
             </a:r>
-            <a:endParaRPr lang="bg-BG" dirty="0"/>
+            <a:endParaRPr lang="bg-BG" sz="3600" dirty="0"/>
           </a:p>
         </p:txBody>
       </p:sp>
@@ -6023,8 +6156,8 @@
         </p:blipFill>
         <p:spPr>
           <a:xfrm>
-            <a:off x="-3038475" y="-1200150"/>
-            <a:ext cx="18268950" cy="9886950"/>
+            <a:off x="250166" y="1043796"/>
+            <a:ext cx="11654287" cy="5814203"/>
           </a:xfrm>
           <a:prstGeom prst="rect">
             <a:avLst/>

</xml_diff>